<commit_message>
Finished draft of complete-lecture-barcharts.Rmd
</commit_message>
<xml_diff>
--- a/data-viz-02/component/exercise-gender-barchart.pptx
+++ b/data-viz-02/component/exercise-gender-barchart.pptx
@@ -12,7 +12,6 @@
     <p:sldId id="260" r:id="rId6"/>
     <p:sldId id="261" r:id="rId7"/>
     <p:sldId id="262" r:id="rId8"/>
-    <p:sldId id="263" r:id="rId9"/>
   </p:sldIdLst>
   <p:sldSz cx="9144000" cy="6858000" type="screen4x3"/>
   <p:notesSz cx="6858000" cy="9144000"/>
@@ -3365,7 +3364,7 @@
             </a:r>
             <a:r>
               <a:rPr/>
-              <a:t>Gender</a:t>
+              <a:t>Python</a:t>
             </a:r>
             <a:r>
               <a:rPr/>
@@ -3373,23 +3372,7 @@
             </a:r>
             <a:r>
               <a:rPr/>
-              <a:t>barchart,</a:t>
-            </a:r>
-            <a:r>
-              <a:rPr/>
-              <a:t> </a:t>
-            </a:r>
-            <a:r>
-              <a:rPr/>
-              <a:t>Python</a:t>
-            </a:r>
-            <a:r>
-              <a:rPr/>
-              <a:t> </a:t>
-            </a:r>
-            <a:r>
-              <a:rPr/>
-              <a:t>(1/2)</a:t>
+              <a:t>code</a:t>
             </a:r>
           </a:p>
         </p:txBody>
@@ -3412,7 +3395,7 @@
             <a:pPr lvl="1"/>
             <a:r>
               <a:rPr/>
-              <a:t>Python code</a:t>
+              <a:t>Here’s the Python code</a:t>
             </a:r>
           </a:p>
           <a:p>
@@ -3424,7 +3407,7 @@
                 <a:latin typeface="Courier"/>
               </a:rPr>
               <a:t>ch = alt.Chart(df).mark_bar().encode(
-    x='Sex',
+    x='sex',
     y='count()'
 )</a:t>
             </a:r>
@@ -3481,7 +3464,7 @@
             </a:r>
             <a:r>
               <a:rPr/>
-              <a:t>Gender</a:t>
+              <a:t>Python</a:t>
             </a:r>
             <a:r>
               <a:rPr/>
@@ -3489,30 +3472,14 @@
             </a:r>
             <a:r>
               <a:rPr/>
-              <a:t>barchart,</a:t>
-            </a:r>
-            <a:r>
-              <a:rPr/>
-              <a:t> </a:t>
-            </a:r>
-            <a:r>
-              <a:rPr/>
-              <a:t>Python</a:t>
-            </a:r>
-            <a:r>
-              <a:rPr/>
-              <a:t> </a:t>
-            </a:r>
-            <a:r>
-              <a:rPr/>
-              <a:t>results</a:t>
+              <a:t>output</a:t>
             </a:r>
           </a:p>
         </p:txBody>
       </p:sp>
       <p:pic>
         <p:nvPicPr>
-          <p:cNvPr descr="../images/gender-barchart.png" id="0" name="Picture 1"/>
+          <p:cNvPr descr="../images/python/gender-barchart.png" id="0" name="Picture 1"/>
           <p:cNvPicPr>
             <a:picLocks noGrp="1" noChangeAspect="1"/>
           </p:cNvPicPr>
@@ -3590,7 +3557,7 @@
             </a:r>
             <a:r>
               <a:rPr/>
-              <a:t>Gender</a:t>
+              <a:t>R</a:t>
             </a:r>
             <a:r>
               <a:rPr/>
@@ -3598,22 +3565,6 @@
             </a:r>
             <a:r>
               <a:rPr/>
-              <a:t>barchart,</a:t>
-            </a:r>
-            <a:r>
-              <a:rPr/>
-              <a:t> </a:t>
-            </a:r>
-            <a:r>
-              <a:rPr/>
-              <a:t>R</a:t>
-            </a:r>
-            <a:r>
-              <a:rPr/>
-              <a:t> </a:t>
-            </a:r>
-            <a:r>
-              <a:rPr/>
               <a:t>code</a:t>
             </a:r>
           </a:p>
@@ -3637,7 +3588,7 @@
             <a:pPr lvl="1"/>
             <a:r>
               <a:rPr/>
-              <a:t>R code</a:t>
+              <a:t>Here’s the R code</a:t>
             </a:r>
           </a:p>
           <a:p>
@@ -3648,7 +3599,7 @@
               <a:rPr sz="1800">
                 <a:latin typeface="Courier"/>
               </a:rPr>
-              <a:t>ggplot(titanic, aes(Pclass)) +
+              <a:t>ggplot(titanic, aes(sex)) +
   geom_bar()</a:t>
             </a:r>
           </a:p>
@@ -3704,7 +3655,7 @@
             </a:r>
             <a:r>
               <a:rPr/>
-              <a:t>Gender</a:t>
+              <a:t>R</a:t>
             </a:r>
             <a:r>
               <a:rPr/>
@@ -3712,30 +3663,14 @@
             </a:r>
             <a:r>
               <a:rPr/>
-              <a:t>barchart,</a:t>
-            </a:r>
-            <a:r>
-              <a:rPr/>
-              <a:t> </a:t>
-            </a:r>
-            <a:r>
-              <a:rPr/>
-              <a:t>R</a:t>
-            </a:r>
-            <a:r>
-              <a:rPr/>
-              <a:t> </a:t>
-            </a:r>
-            <a:r>
-              <a:rPr/>
-              <a:t>results</a:t>
+              <a:t>output</a:t>
             </a:r>
           </a:p>
         </p:txBody>
       </p:sp>
       <p:pic>
         <p:nvPicPr>
-          <p:cNvPr descr="../images/r-gender-barchart.png" id="0" name="Picture 1"/>
+          <p:cNvPr descr="../images/r/gender-barchart.png" id="0" name="Picture 1"/>
           <p:cNvPicPr>
             <a:picLocks noGrp="1" noChangeAspect="1"/>
           </p:cNvPicPr>
@@ -3749,8 +3684,8 @@
         </p:blipFill>
         <p:spPr bwMode="auto">
           <a:xfrm>
-            <a:off x="2565400" y="1600200"/>
-            <a:ext cx="4013200" cy="4013200"/>
+            <a:off x="2311400" y="1600200"/>
+            <a:ext cx="4521200" cy="4521200"/>
           </a:xfrm>
           <a:prstGeom prst="rect">
             <a:avLst/>
@@ -3763,52 +3698,6 @@
           </a:ln>
         </p:spPr>
       </p:pic>
-      <p:sp>
-        <p:nvSpPr>
-          <p:cNvPr id="1" name="TextBox 3"/>
-          <p:cNvSpPr txBox="1"/>
-          <p:nvPr/>
-        </p:nvSpPr>
-        <p:spPr>
-          <a:xfrm>
-            <a:off x="457200" y="5613400"/>
-            <a:ext cx="8229600" cy="508000"/>
-          </a:xfrm>
-          <a:prstGeom prst="rect">
-            <a:avLst/>
-          </a:prstGeom>
-          <a:noFill/>
-        </p:spPr>
-        <p:txBody>
-          <a:bodyPr/>
-          <a:lstStyle/>
-          <a:p>
-            <a:pPr lvl="0" marL="0" indent="0" algn="ctr">
-              <a:buNone/>
-            </a:pPr>
-            <a:r>
-              <a:rPr/>
-              <a:t>r</a:t>
-            </a:r>
-            <a:r>
-              <a:rPr/>
-              <a:t> </a:t>
-            </a:r>
-            <a:r>
-              <a:rPr/>
-              <a:t>gender</a:t>
-            </a:r>
-            <a:r>
-              <a:rPr/>
-              <a:t> </a:t>
-            </a:r>
-            <a:r>
-              <a:rPr/>
-              <a:t>barchart</a:t>
-            </a:r>
-          </a:p>
-        </p:txBody>
-      </p:sp>
     </p:spTree>
   </p:cSld>
 </p:sld>
@@ -3859,7 +3748,7 @@
             </a:r>
             <a:r>
               <a:rPr/>
-              <a:t>Gender</a:t>
+              <a:t>Tableau</a:t>
             </a:r>
             <a:r>
               <a:rPr/>
@@ -3867,134 +3756,14 @@
             </a:r>
             <a:r>
               <a:rPr/>
-              <a:t>barchart,</a:t>
-            </a:r>
-            <a:r>
-              <a:rPr/>
-              <a:t> </a:t>
-            </a:r>
-            <a:r>
-              <a:rPr/>
-              <a:t>Tableau</a:t>
-            </a:r>
-            <a:r>
-              <a:rPr/>
-              <a:t> </a:t>
-            </a:r>
-            <a:r>
-              <a:rPr/>
-              <a:t>steps</a:t>
-            </a:r>
-          </a:p>
-        </p:txBody>
-      </p:sp>
-      <p:sp>
-        <p:nvSpPr>
-          <p:cNvPr id="3" name="Content Placeholder 2"/>
-          <p:cNvSpPr>
-            <a:spLocks noGrp="1"/>
-          </p:cNvSpPr>
-          <p:nvPr>
-            <p:ph idx="1"/>
-          </p:nvPr>
-        </p:nvSpPr>
-        <p:spPr/>
-        <p:txBody>
-          <a:bodyPr/>
-          <a:lstStyle/>
-          <a:p>
-            <a:pPr lvl="0" marL="0" indent="0">
-              <a:buNone/>
-            </a:pPr>
-            <a:r>
-              <a:rPr/>
-              <a:t>((Tableau steps))</a:t>
-            </a:r>
-          </a:p>
-        </p:txBody>
-      </p:sp>
-    </p:spTree>
-  </p:cSld>
-</p:sld>
-</file>
-
-<file path=ppt/slides/slide8.xml><?xml version="1.0" encoding="utf-8"?>
-<p:sld xmlns:a="http://schemas.openxmlformats.org/drawingml/2006/main" xmlns:r="http://schemas.openxmlformats.org/officeDocument/2006/relationships" xmlns:p="http://schemas.openxmlformats.org/presentationml/2006/main">
-  <p:cSld>
-    <p:spTree>
-      <p:nvGrpSpPr>
-        <p:cNvPr id="1" name=""/>
-        <p:cNvGrpSpPr/>
-        <p:nvPr/>
-      </p:nvGrpSpPr>
-      <p:grpSpPr>
-        <a:xfrm>
-          <a:off x="0" y="0"/>
-          <a:ext cx="0" cy="0"/>
-          <a:chOff x="0" y="0"/>
-          <a:chExt cx="0" cy="0"/>
-        </a:xfrm>
-      </p:grpSpPr>
-      <p:sp>
-        <p:nvSpPr>
-          <p:cNvPr id="2" name="Title 1"/>
-          <p:cNvSpPr>
-            <a:spLocks noGrp="1"/>
-          </p:cNvSpPr>
-          <p:nvPr>
-            <p:ph type="title"/>
-          </p:nvPr>
-        </p:nvSpPr>
-        <p:spPr/>
-        <p:txBody>
-          <a:bodyPr/>
-          <a:lstStyle/>
-          <a:p>
-            <a:pPr lvl="0" marL="0" indent="0">
-              <a:buNone/>
-            </a:pPr>
-            <a:r>
-              <a:rPr/>
-              <a:t>Exercise,</a:t>
-            </a:r>
-            <a:r>
-              <a:rPr/>
-              <a:t> </a:t>
-            </a:r>
-            <a:r>
-              <a:rPr/>
-              <a:t>Gender</a:t>
-            </a:r>
-            <a:r>
-              <a:rPr/>
-              <a:t> </a:t>
-            </a:r>
-            <a:r>
-              <a:rPr/>
-              <a:t>barchart,</a:t>
-            </a:r>
-            <a:r>
-              <a:rPr/>
-              <a:t> </a:t>
-            </a:r>
-            <a:r>
-              <a:rPr/>
-              <a:t>Tableau</a:t>
-            </a:r>
-            <a:r>
-              <a:rPr/>
-              <a:t> </a:t>
-            </a:r>
-            <a:r>
-              <a:rPr/>
-              <a:t>results</a:t>
+              <a:t>output</a:t>
             </a:r>
           </a:p>
         </p:txBody>
       </p:sp>
       <p:pic>
         <p:nvPicPr>
-          <p:cNvPr descr="../images/tableau-gender-barchart.png" id="0" name="Picture 1"/>
+          <p:cNvPr descr="../images/tableau/gender-barchart.png" id="0" name="Picture 1"/>
           <p:cNvPicPr>
             <a:picLocks noGrp="1" noChangeAspect="1"/>
           </p:cNvPicPr>

</xml_diff>